<commit_message>
Small changes to Presentation
</commit_message>
<xml_diff>
--- a/Midterm Presentation.pptx
+++ b/Midterm Presentation.pptx
@@ -6215,8 +6215,21 @@
             </a:r>
             <a:r>
               <a:rPr lang="en-US" dirty="0" smtClean="0"/>
-              <a:t> is a webpage that shows local places to eat and allows users to comment and rate.</a:t>
-            </a:r>
+              <a:t> is a webpage that shows local </a:t>
+            </a:r>
+            <a:r>
+              <a:rPr lang="en-US" dirty="0" smtClean="0"/>
+              <a:t>restaurants </a:t>
+            </a:r>
+            <a:r>
+              <a:rPr lang="en-US" dirty="0" smtClean="0"/>
+              <a:t>and allows users to comment and </a:t>
+            </a:r>
+            <a:r>
+              <a:rPr lang="en-US" dirty="0" smtClean="0"/>
+              <a:t>rate them.</a:t>
+            </a:r>
+            <a:endParaRPr lang="en-US" dirty="0" smtClean="0"/>
           </a:p>
           <a:p>
             <a:endParaRPr lang="en-US" dirty="0" smtClean="0"/>
@@ -6334,7 +6347,20 @@
           <a:p>
             <a:r>
               <a:rPr lang="en-US" dirty="0" smtClean="0"/>
-              <a:t>Foursquare API</a:t>
+              <a:t>Foursquare </a:t>
+            </a:r>
+            <a:r>
+              <a:rPr lang="en-US" dirty="0" smtClean="0"/>
+              <a:t>API</a:t>
+            </a:r>
+          </a:p>
+          <a:p>
+            <a:endParaRPr lang="en-US" dirty="0"/>
+          </a:p>
+          <a:p>
+            <a:r>
+              <a:rPr lang="en-US" dirty="0" smtClean="0"/>
+              <a:t>HTML/CSS styling</a:t>
             </a:r>
             <a:endParaRPr lang="en-US" dirty="0" smtClean="0"/>
           </a:p>

</xml_diff>

<commit_message>
Apparently I didn't commit this.
</commit_message>
<xml_diff>
--- a/Midterm Presentation.pptx
+++ b/Midterm Presentation.pptx
@@ -7,9 +7,10 @@
   <p:sldIdLst>
     <p:sldId id="256" r:id="rId2"/>
     <p:sldId id="257" r:id="rId3"/>
-    <p:sldId id="258" r:id="rId4"/>
-    <p:sldId id="259" r:id="rId5"/>
-    <p:sldId id="260" r:id="rId6"/>
+    <p:sldId id="261" r:id="rId4"/>
+    <p:sldId id="258" r:id="rId5"/>
+    <p:sldId id="259" r:id="rId6"/>
+    <p:sldId id="260" r:id="rId7"/>
   </p:sldIdLst>
   <p:sldSz cx="9144000" cy="6858000" type="screen4x3"/>
   <p:notesSz cx="6858000" cy="9144000"/>
@@ -392,7 +393,7 @@
             <a:fld id="{9002AF2B-AF1F-49F3-A790-D71D9C9C04F1}" type="datetimeFigureOut">
               <a:rPr lang="en-US" smtClean="0"/>
               <a:pPr/>
-              <a:t>10/11/2012</a:t>
+              <a:t>10/18/2012</a:t>
             </a:fld>
             <a:endParaRPr lang="en-US"/>
           </a:p>
@@ -787,7 +788,7 @@
             <a:fld id="{9002AF2B-AF1F-49F3-A790-D71D9C9C04F1}" type="datetimeFigureOut">
               <a:rPr lang="en-US" smtClean="0"/>
               <a:pPr/>
-              <a:t>10/11/2012</a:t>
+              <a:t>10/18/2012</a:t>
             </a:fld>
             <a:endParaRPr lang="en-US"/>
           </a:p>
@@ -1322,7 +1323,7 @@
             <a:fld id="{9002AF2B-AF1F-49F3-A790-D71D9C9C04F1}" type="datetimeFigureOut">
               <a:rPr lang="en-US" smtClean="0"/>
               <a:pPr/>
-              <a:t>10/11/2012</a:t>
+              <a:t>10/18/2012</a:t>
             </a:fld>
             <a:endParaRPr lang="en-US"/>
           </a:p>
@@ -1456,7 +1457,7 @@
             <a:fld id="{9002AF2B-AF1F-49F3-A790-D71D9C9C04F1}" type="datetimeFigureOut">
               <a:rPr lang="en-US" smtClean="0"/>
               <a:pPr/>
-              <a:t>10/11/2012</a:t>
+              <a:t>10/18/2012</a:t>
             </a:fld>
             <a:endParaRPr lang="en-US"/>
           </a:p>
@@ -2001,7 +2002,7 @@
             <a:fld id="{9002AF2B-AF1F-49F3-A790-D71D9C9C04F1}" type="datetimeFigureOut">
               <a:rPr lang="en-US" smtClean="0"/>
               <a:pPr/>
-              <a:t>10/11/2012</a:t>
+              <a:t>10/18/2012</a:t>
             </a:fld>
             <a:endParaRPr lang="en-US"/>
           </a:p>
@@ -2298,7 +2299,7 @@
             <a:fld id="{9002AF2B-AF1F-49F3-A790-D71D9C9C04F1}" type="datetimeFigureOut">
               <a:rPr lang="en-US" smtClean="0"/>
               <a:pPr/>
-              <a:t>10/11/2012</a:t>
+              <a:t>10/18/2012</a:t>
             </a:fld>
             <a:endParaRPr lang="en-US"/>
           </a:p>
@@ -2959,7 +2960,7 @@
             <a:fld id="{9002AF2B-AF1F-49F3-A790-D71D9C9C04F1}" type="datetimeFigureOut">
               <a:rPr lang="en-US" smtClean="0"/>
               <a:pPr/>
-              <a:t>10/11/2012</a:t>
+              <a:t>10/18/2012</a:t>
             </a:fld>
             <a:endParaRPr lang="en-US"/>
           </a:p>
@@ -3397,7 +3398,7 @@
             <a:fld id="{9002AF2B-AF1F-49F3-A790-D71D9C9C04F1}" type="datetimeFigureOut">
               <a:rPr lang="en-US" smtClean="0"/>
               <a:pPr/>
-              <a:t>10/11/2012</a:t>
+              <a:t>10/18/2012</a:t>
             </a:fld>
             <a:endParaRPr lang="en-US"/>
           </a:p>
@@ -3712,7 +3713,7 @@
             <a:fld id="{9002AF2B-AF1F-49F3-A790-D71D9C9C04F1}" type="datetimeFigureOut">
               <a:rPr lang="en-US" smtClean="0"/>
               <a:pPr/>
-              <a:t>10/11/2012</a:t>
+              <a:t>10/18/2012</a:t>
             </a:fld>
             <a:endParaRPr lang="en-US"/>
           </a:p>
@@ -4447,7 +4448,7 @@
             <a:fld id="{9002AF2B-AF1F-49F3-A790-D71D9C9C04F1}" type="datetimeFigureOut">
               <a:rPr lang="en-US" smtClean="0"/>
               <a:pPr/>
-              <a:t>10/11/2012</a:t>
+              <a:t>10/18/2012</a:t>
             </a:fld>
             <a:endParaRPr lang="en-US"/>
           </a:p>
@@ -5113,7 +5114,7 @@
             <a:fld id="{9002AF2B-AF1F-49F3-A790-D71D9C9C04F1}" type="datetimeFigureOut">
               <a:rPr lang="en-US" smtClean="0"/>
               <a:pPr/>
-              <a:t>10/11/2012</a:t>
+              <a:t>10/18/2012</a:t>
             </a:fld>
             <a:endParaRPr lang="en-US"/>
           </a:p>
@@ -5387,7 +5388,7 @@
             <a:fld id="{9002AF2B-AF1F-49F3-A790-D71D9C9C04F1}" type="datetimeFigureOut">
               <a:rPr lang="en-US" smtClean="0"/>
               <a:pPr/>
-              <a:t>10/11/2012</a:t>
+              <a:t>10/18/2012</a:t>
             </a:fld>
             <a:endParaRPr lang="en-US"/>
           </a:p>
@@ -6215,21 +6216,16 @@
             </a:r>
             <a:r>
               <a:rPr lang="en-US" dirty="0" smtClean="0"/>
-              <a:t> is a webpage that shows local </a:t>
+              <a:t> is a webpage that </a:t>
             </a:r>
             <a:r>
               <a:rPr lang="en-US" dirty="0" smtClean="0"/>
-              <a:t>restaurants </a:t>
+              <a:t>finds </a:t>
             </a:r>
             <a:r>
               <a:rPr lang="en-US" dirty="0" smtClean="0"/>
-              <a:t>and allows users to comment and </a:t>
-            </a:r>
-            <a:r>
-              <a:rPr lang="en-US" dirty="0" smtClean="0"/>
-              <a:t>rate them.</a:t>
-            </a:r>
-            <a:endParaRPr lang="en-US" dirty="0" smtClean="0"/>
+              <a:t>local restaurants and allows users to comment and rate them.</a:t>
+            </a:r>
           </a:p>
           <a:p>
             <a:endParaRPr lang="en-US" dirty="0" smtClean="0"/>
@@ -6284,95 +6280,305 @@
           <a:p>
             <a:r>
               <a:rPr lang="en-US" dirty="0" smtClean="0"/>
-              <a:t>Completed Tasks</a:t>
+              <a:t>Technologies</a:t>
             </a:r>
             <a:endParaRPr lang="en-US" dirty="0"/>
           </a:p>
         </p:txBody>
       </p:sp>
-      <p:sp>
-        <p:nvSpPr>
-          <p:cNvPr id="3" name="Content Placeholder 2"/>
-          <p:cNvSpPr>
-            <a:spLocks noGrp="1"/>
-          </p:cNvSpPr>
-          <p:nvPr>
-            <p:ph sz="quarter" idx="1"/>
-          </p:nvPr>
-        </p:nvSpPr>
-        <p:spPr/>
-        <p:txBody>
-          <a:bodyPr/>
-          <a:lstStyle/>
-          <a:p>
-            <a:endParaRPr lang="en-US" dirty="0" smtClean="0"/>
-          </a:p>
-          <a:p>
-            <a:endParaRPr lang="en-US" dirty="0" smtClean="0"/>
-          </a:p>
-          <a:p>
-            <a:r>
-              <a:rPr lang="en-US" dirty="0" err="1" smtClean="0"/>
-              <a:t>Facebook</a:t>
-            </a:r>
-            <a:r>
-              <a:rPr lang="en-US" dirty="0" smtClean="0"/>
-              <a:t> login</a:t>
-            </a:r>
-          </a:p>
-          <a:p>
-            <a:endParaRPr lang="en-US" dirty="0" smtClean="0"/>
-          </a:p>
-          <a:p>
-            <a:r>
-              <a:rPr lang="en-US" dirty="0" err="1" smtClean="0"/>
-              <a:t>Mapbox</a:t>
-            </a:r>
-            <a:r>
-              <a:rPr lang="en-US" dirty="0" smtClean="0"/>
-              <a:t> (w/ HTML5 </a:t>
-            </a:r>
-            <a:r>
-              <a:rPr lang="en-US" dirty="0" err="1" smtClean="0"/>
-              <a:t>Geolocation</a:t>
-            </a:r>
-            <a:r>
-              <a:rPr lang="en-US" dirty="0" smtClean="0"/>
-              <a:t>)</a:t>
-            </a:r>
-          </a:p>
-          <a:p>
-            <a:endParaRPr lang="en-US" dirty="0" smtClean="0"/>
-          </a:p>
-          <a:p>
-            <a:r>
-              <a:rPr lang="en-US" dirty="0" smtClean="0"/>
-              <a:t>Foursquare </a:t>
-            </a:r>
-            <a:r>
-              <a:rPr lang="en-US" dirty="0" smtClean="0"/>
-              <a:t>API</a:t>
-            </a:r>
-          </a:p>
-          <a:p>
-            <a:endParaRPr lang="en-US" dirty="0"/>
-          </a:p>
-          <a:p>
-            <a:r>
-              <a:rPr lang="en-US" dirty="0" smtClean="0"/>
-              <a:t>HTML/CSS styling</a:t>
-            </a:r>
-            <a:endParaRPr lang="en-US" dirty="0" smtClean="0"/>
-          </a:p>
-          <a:p>
-            <a:endParaRPr lang="en-US" dirty="0" smtClean="0"/>
-          </a:p>
-          <a:p>
-            <a:endParaRPr lang="en-US" dirty="0"/>
-          </a:p>
-        </p:txBody>
-      </p:sp>
+      <p:pic>
+        <p:nvPicPr>
+          <p:cNvPr id="1026" name="Picture 2" descr="E:\logos\77-asp-net-mvc-4-codingcluster-745669.png"/>
+          <p:cNvPicPr>
+            <a:picLocks noChangeAspect="1" noChangeArrowheads="1"/>
+          </p:cNvPicPr>
+          <p:nvPr/>
+        </p:nvPicPr>
+        <p:blipFill>
+          <a:blip r:embed="rId2">
+            <a:extLst>
+              <a:ext uri="{28A0092B-C50C-407E-A947-70E740481C1C}">
+                <a14:useLocalDpi xmlns:a14="http://schemas.microsoft.com/office/drawing/2010/main" val="0"/>
+              </a:ext>
+            </a:extLst>
+          </a:blip>
+          <a:srcRect/>
+          <a:stretch>
+            <a:fillRect/>
+          </a:stretch>
+        </p:blipFill>
+        <p:spPr bwMode="auto">
+          <a:xfrm>
+            <a:off x="526789" y="3429000"/>
+            <a:ext cx="1651696" cy="1282700"/>
+          </a:xfrm>
+          <a:prstGeom prst="rect">
+            <a:avLst/>
+          </a:prstGeom>
+          <a:noFill/>
+          <a:extLst>
+            <a:ext uri="{909E8E84-426E-40DD-AFC4-6F175D3DCCD1}">
+              <a14:hiddenFill xmlns:a14="http://schemas.microsoft.com/office/drawing/2010/main">
+                <a:solidFill>
+                  <a:srgbClr val="FFFFFF"/>
+                </a:solidFill>
+              </a14:hiddenFill>
+            </a:ext>
+          </a:extLst>
+        </p:spPr>
+      </p:pic>
+      <p:pic>
+        <p:nvPicPr>
+          <p:cNvPr id="1027" name="Picture 3" descr="E:\logos\Article_EntityFramework.jpg"/>
+          <p:cNvPicPr>
+            <a:picLocks noChangeAspect="1" noChangeArrowheads="1"/>
+          </p:cNvPicPr>
+          <p:nvPr/>
+        </p:nvPicPr>
+        <p:blipFill>
+          <a:blip r:embed="rId3">
+            <a:extLst>
+              <a:ext uri="{28A0092B-C50C-407E-A947-70E740481C1C}">
+                <a14:useLocalDpi xmlns:a14="http://schemas.microsoft.com/office/drawing/2010/main" val="0"/>
+              </a:ext>
+            </a:extLst>
+          </a:blip>
+          <a:srcRect/>
+          <a:stretch>
+            <a:fillRect/>
+          </a:stretch>
+        </p:blipFill>
+        <p:spPr bwMode="auto">
+          <a:xfrm>
+            <a:off x="6858000" y="3429000"/>
+            <a:ext cx="1714500" cy="1282700"/>
+          </a:xfrm>
+          <a:prstGeom prst="rect">
+            <a:avLst/>
+          </a:prstGeom>
+          <a:noFill/>
+          <a:extLst>
+            <a:ext uri="{909E8E84-426E-40DD-AFC4-6F175D3DCCD1}">
+              <a14:hiddenFill xmlns:a14="http://schemas.microsoft.com/office/drawing/2010/main">
+                <a:solidFill>
+                  <a:srgbClr val="FFFFFF"/>
+                </a:solidFill>
+              </a14:hiddenFill>
+            </a:ext>
+          </a:extLst>
+        </p:spPr>
+      </p:pic>
+      <p:pic>
+        <p:nvPicPr>
+          <p:cNvPr id="1028" name="Picture 4" descr="E:\logos\facebook_logo.png"/>
+          <p:cNvPicPr>
+            <a:picLocks noChangeAspect="1" noChangeArrowheads="1"/>
+          </p:cNvPicPr>
+          <p:nvPr/>
+        </p:nvPicPr>
+        <p:blipFill>
+          <a:blip r:embed="rId4" cstate="print">
+            <a:extLst>
+              <a:ext uri="{28A0092B-C50C-407E-A947-70E740481C1C}">
+                <a14:useLocalDpi xmlns:a14="http://schemas.microsoft.com/office/drawing/2010/main" val="0"/>
+              </a:ext>
+            </a:extLst>
+          </a:blip>
+          <a:srcRect/>
+          <a:stretch>
+            <a:fillRect/>
+          </a:stretch>
+        </p:blipFill>
+        <p:spPr bwMode="auto">
+          <a:xfrm>
+            <a:off x="4085152" y="3332244"/>
+            <a:ext cx="953691" cy="953691"/>
+          </a:xfrm>
+          <a:prstGeom prst="rect">
+            <a:avLst/>
+          </a:prstGeom>
+          <a:noFill/>
+          <a:extLst>
+            <a:ext uri="{909E8E84-426E-40DD-AFC4-6F175D3DCCD1}">
+              <a14:hiddenFill xmlns:a14="http://schemas.microsoft.com/office/drawing/2010/main">
+                <a:solidFill>
+                  <a:srgbClr val="FFFFFF"/>
+                </a:solidFill>
+              </a14:hiddenFill>
+            </a:ext>
+          </a:extLst>
+        </p:spPr>
+      </p:pic>
+      <p:pic>
+        <p:nvPicPr>
+          <p:cNvPr id="1029" name="Picture 5" descr="E:\logos\foursquare_logo1.png"/>
+          <p:cNvPicPr>
+            <a:picLocks noChangeAspect="1" noChangeArrowheads="1"/>
+          </p:cNvPicPr>
+          <p:nvPr/>
+        </p:nvPicPr>
+        <p:blipFill>
+          <a:blip r:embed="rId5">
+            <a:extLst>
+              <a:ext uri="{28A0092B-C50C-407E-A947-70E740481C1C}">
+                <a14:useLocalDpi xmlns:a14="http://schemas.microsoft.com/office/drawing/2010/main" val="0"/>
+              </a:ext>
+            </a:extLst>
+          </a:blip>
+          <a:srcRect/>
+          <a:stretch>
+            <a:fillRect/>
+          </a:stretch>
+        </p:blipFill>
+        <p:spPr bwMode="auto">
+          <a:xfrm>
+            <a:off x="5083629" y="5194005"/>
+            <a:ext cx="2764912" cy="1114176"/>
+          </a:xfrm>
+          <a:prstGeom prst="rect">
+            <a:avLst/>
+          </a:prstGeom>
+          <a:noFill/>
+          <a:extLst>
+            <a:ext uri="{909E8E84-426E-40DD-AFC4-6F175D3DCCD1}">
+              <a14:hiddenFill xmlns:a14="http://schemas.microsoft.com/office/drawing/2010/main">
+                <a:solidFill>
+                  <a:srgbClr val="FFFFFF"/>
+                </a:solidFill>
+              </a14:hiddenFill>
+            </a:ext>
+          </a:extLst>
+        </p:spPr>
+      </p:pic>
+      <p:pic>
+        <p:nvPicPr>
+          <p:cNvPr id="1030" name="Picture 6" descr="E:\logos\icon_mssql_0.png"/>
+          <p:cNvPicPr>
+            <a:picLocks noChangeAspect="1" noChangeArrowheads="1"/>
+          </p:cNvPicPr>
+          <p:nvPr/>
+        </p:nvPicPr>
+        <p:blipFill>
+          <a:blip r:embed="rId6">
+            <a:extLst>
+              <a:ext uri="{28A0092B-C50C-407E-A947-70E740481C1C}">
+                <a14:useLocalDpi xmlns:a14="http://schemas.microsoft.com/office/drawing/2010/main" val="0"/>
+              </a:ext>
+            </a:extLst>
+          </a:blip>
+          <a:srcRect/>
+          <a:stretch>
+            <a:fillRect/>
+          </a:stretch>
+        </p:blipFill>
+        <p:spPr bwMode="auto">
+          <a:xfrm>
+            <a:off x="5410200" y="1656755"/>
+            <a:ext cx="1966680" cy="1616579"/>
+          </a:xfrm>
+          <a:prstGeom prst="rect">
+            <a:avLst/>
+          </a:prstGeom>
+          <a:noFill/>
+          <a:extLst>
+            <a:ext uri="{909E8E84-426E-40DD-AFC4-6F175D3DCCD1}">
+              <a14:hiddenFill xmlns:a14="http://schemas.microsoft.com/office/drawing/2010/main">
+                <a:solidFill>
+                  <a:srgbClr val="FFFFFF"/>
+                </a:solidFill>
+              </a14:hiddenFill>
+            </a:ext>
+          </a:extLst>
+        </p:spPr>
+      </p:pic>
+      <p:pic>
+        <p:nvPicPr>
+          <p:cNvPr id="1032" name="Picture 8" descr="E:\logos\visual-studio-2010-logo.png"/>
+          <p:cNvPicPr>
+            <a:picLocks noChangeAspect="1" noChangeArrowheads="1"/>
+          </p:cNvPicPr>
+          <p:nvPr/>
+        </p:nvPicPr>
+        <p:blipFill>
+          <a:blip r:embed="rId7">
+            <a:extLst>
+              <a:ext uri="{28A0092B-C50C-407E-A947-70E740481C1C}">
+                <a14:useLocalDpi xmlns:a14="http://schemas.microsoft.com/office/drawing/2010/main" val="0"/>
+              </a:ext>
+            </a:extLst>
+          </a:blip>
+          <a:srcRect/>
+          <a:stretch>
+            <a:fillRect/>
+          </a:stretch>
+        </p:blipFill>
+        <p:spPr bwMode="auto">
+          <a:xfrm>
+            <a:off x="1752600" y="1656756"/>
+            <a:ext cx="1828800" cy="1397110"/>
+          </a:xfrm>
+          <a:prstGeom prst="rect">
+            <a:avLst/>
+          </a:prstGeom>
+          <a:noFill/>
+          <a:extLst>
+            <a:ext uri="{909E8E84-426E-40DD-AFC4-6F175D3DCCD1}">
+              <a14:hiddenFill xmlns:a14="http://schemas.microsoft.com/office/drawing/2010/main">
+                <a:solidFill>
+                  <a:srgbClr val="FFFFFF"/>
+                </a:solidFill>
+              </a14:hiddenFill>
+            </a:ext>
+          </a:extLst>
+        </p:spPr>
+      </p:pic>
+      <p:pic>
+        <p:nvPicPr>
+          <p:cNvPr id="1034" name="Picture 10" descr="http://drupal.org/files/images/OQAAAI1PPrJY0nBALB7mkvju3mkQXqLmzMhxEjeb4gp8aujEUQcLfLyy-Sn4gZdkAas6-k8eYbQlGDE-GCjKfF5gIrUA15jOjFfLRv77VBd5t-WfZURdP9V3PdmT.png"/>
+          <p:cNvPicPr>
+            <a:picLocks noChangeAspect="1" noChangeArrowheads="1"/>
+          </p:cNvPicPr>
+          <p:nvPr/>
+        </p:nvPicPr>
+        <p:blipFill>
+          <a:blip r:embed="rId8" cstate="print">
+            <a:extLst>
+              <a:ext uri="{28A0092B-C50C-407E-A947-70E740481C1C}">
+                <a14:useLocalDpi xmlns:a14="http://schemas.microsoft.com/office/drawing/2010/main" val="0"/>
+              </a:ext>
+            </a:extLst>
+          </a:blip>
+          <a:srcRect/>
+          <a:stretch>
+            <a:fillRect/>
+          </a:stretch>
+        </p:blipFill>
+        <p:spPr bwMode="auto">
+          <a:xfrm>
+            <a:off x="1295400" y="5429831"/>
+            <a:ext cx="2789752" cy="686067"/>
+          </a:xfrm>
+          <a:prstGeom prst="rect">
+            <a:avLst/>
+          </a:prstGeom>
+          <a:noFill/>
+          <a:extLst>
+            <a:ext uri="{909E8E84-426E-40DD-AFC4-6F175D3DCCD1}">
+              <a14:hiddenFill xmlns:a14="http://schemas.microsoft.com/office/drawing/2010/main">
+                <a:solidFill>
+                  <a:srgbClr val="FFFFFF"/>
+                </a:solidFill>
+              </a14:hiddenFill>
+            </a:ext>
+          </a:extLst>
+        </p:spPr>
+      </p:pic>
     </p:spTree>
+    <p:extLst>
+      <p:ext uri="{BB962C8B-B14F-4D97-AF65-F5344CB8AC3E}">
+        <p14:creationId xmlns:p14="http://schemas.microsoft.com/office/powerpoint/2010/main" val="1808314159"/>
+      </p:ext>
+    </p:extLst>
   </p:cSld>
   <p:clrMapOvr>
     <a:masterClrMapping/>
@@ -6414,7 +6620,7 @@
           <a:p>
             <a:r>
               <a:rPr lang="en-US" dirty="0" smtClean="0"/>
-              <a:t>Ideas</a:t>
+              <a:t>Completed Tasks</a:t>
             </a:r>
             <a:endParaRPr lang="en-US" dirty="0"/>
           </a:p>
@@ -6435,28 +6641,64 @@
           <a:bodyPr/>
           <a:lstStyle/>
           <a:p>
+            <a:pPr marL="0" indent="0">
+              <a:buNone/>
+            </a:pPr>
             <a:endParaRPr lang="en-US" dirty="0" smtClean="0"/>
           </a:p>
           <a:p>
+            <a:r>
+              <a:rPr lang="en-US" dirty="0" err="1" smtClean="0"/>
+              <a:t>Facebook</a:t>
+            </a:r>
+            <a:r>
+              <a:rPr lang="en-US" dirty="0" smtClean="0"/>
+              <a:t> login</a:t>
+            </a:r>
+          </a:p>
+          <a:p>
             <a:endParaRPr lang="en-US" dirty="0" smtClean="0"/>
           </a:p>
           <a:p>
             <a:r>
+              <a:rPr lang="en-US" dirty="0" err="1" smtClean="0"/>
+              <a:t>Mapbox</a:t>
+            </a:r>
+            <a:r>
               <a:rPr lang="en-US" dirty="0" smtClean="0"/>
-              <a:t>Food Roulette Wheel</a:t>
+              <a:t> (w/ HTML5 </a:t>
+            </a:r>
+            <a:r>
+              <a:rPr lang="en-US" dirty="0" err="1" smtClean="0"/>
+              <a:t>Geolocation</a:t>
+            </a:r>
+            <a:r>
+              <a:rPr lang="en-US" dirty="0" smtClean="0"/>
+              <a:t>)</a:t>
             </a:r>
           </a:p>
           <a:p>
             <a:endParaRPr lang="en-US" dirty="0" smtClean="0"/>
           </a:p>
           <a:p>
+            <a:r>
+              <a:rPr lang="en-US" dirty="0" smtClean="0"/>
+              <a:t>Foursquare API</a:t>
+            </a:r>
+          </a:p>
+          <a:p>
+            <a:endParaRPr lang="en-US" dirty="0"/>
+          </a:p>
+          <a:p>
+            <a:r>
+              <a:rPr lang="en-US" dirty="0" smtClean="0"/>
+              <a:t>HTML/CSS styling</a:t>
+            </a:r>
+          </a:p>
+          <a:p>
             <a:endParaRPr lang="en-US" dirty="0" smtClean="0"/>
           </a:p>
           <a:p>
-            <a:r>
-              <a:rPr lang="en-US" dirty="0" smtClean="0"/>
-              <a:t>Restaurant Coupons</a:t>
-            </a:r>
             <a:endParaRPr lang="en-US" dirty="0"/>
           </a:p>
         </p:txBody>
@@ -6470,6 +6712,95 @@
 </file>
 
 <file path=ppt/slides/slide5.xml><?xml version="1.0" encoding="utf-8"?>
+<p:sld xmlns:a="http://schemas.openxmlformats.org/drawingml/2006/main" xmlns:r="http://schemas.openxmlformats.org/officeDocument/2006/relationships" xmlns:p="http://schemas.openxmlformats.org/presentationml/2006/main">
+  <p:cSld>
+    <p:spTree>
+      <p:nvGrpSpPr>
+        <p:cNvPr id="1" name=""/>
+        <p:cNvGrpSpPr/>
+        <p:nvPr/>
+      </p:nvGrpSpPr>
+      <p:grpSpPr>
+        <a:xfrm>
+          <a:off x="0" y="0"/>
+          <a:ext cx="0" cy="0"/>
+          <a:chOff x="0" y="0"/>
+          <a:chExt cx="0" cy="0"/>
+        </a:xfrm>
+      </p:grpSpPr>
+      <p:sp>
+        <p:nvSpPr>
+          <p:cNvPr id="2" name="Title 1"/>
+          <p:cNvSpPr>
+            <a:spLocks noGrp="1"/>
+          </p:cNvSpPr>
+          <p:nvPr>
+            <p:ph type="title"/>
+          </p:nvPr>
+        </p:nvSpPr>
+        <p:spPr/>
+        <p:txBody>
+          <a:bodyPr/>
+          <a:lstStyle/>
+          <a:p>
+            <a:r>
+              <a:rPr lang="en-US" dirty="0" smtClean="0"/>
+              <a:t>Ideas</a:t>
+            </a:r>
+            <a:endParaRPr lang="en-US" dirty="0"/>
+          </a:p>
+        </p:txBody>
+      </p:sp>
+      <p:sp>
+        <p:nvSpPr>
+          <p:cNvPr id="3" name="Content Placeholder 2"/>
+          <p:cNvSpPr>
+            <a:spLocks noGrp="1"/>
+          </p:cNvSpPr>
+          <p:nvPr>
+            <p:ph sz="quarter" idx="1"/>
+          </p:nvPr>
+        </p:nvSpPr>
+        <p:spPr/>
+        <p:txBody>
+          <a:bodyPr/>
+          <a:lstStyle/>
+          <a:p>
+            <a:endParaRPr lang="en-US" dirty="0" smtClean="0"/>
+          </a:p>
+          <a:p>
+            <a:endParaRPr lang="en-US" dirty="0" smtClean="0"/>
+          </a:p>
+          <a:p>
+            <a:r>
+              <a:rPr lang="en-US" dirty="0" smtClean="0"/>
+              <a:t>Food Roulette Wheel</a:t>
+            </a:r>
+          </a:p>
+          <a:p>
+            <a:endParaRPr lang="en-US" dirty="0" smtClean="0"/>
+          </a:p>
+          <a:p>
+            <a:endParaRPr lang="en-US" dirty="0" smtClean="0"/>
+          </a:p>
+          <a:p>
+            <a:r>
+              <a:rPr lang="en-US" dirty="0" smtClean="0"/>
+              <a:t>Restaurant Coupons</a:t>
+            </a:r>
+            <a:endParaRPr lang="en-US" dirty="0"/>
+          </a:p>
+        </p:txBody>
+      </p:sp>
+    </p:spTree>
+  </p:cSld>
+  <p:clrMapOvr>
+    <a:masterClrMapping/>
+  </p:clrMapOvr>
+</p:sld>
+</file>
+
+<file path=ppt/slides/slide6.xml><?xml version="1.0" encoding="utf-8"?>
 <p:sld xmlns:a="http://schemas.openxmlformats.org/drawingml/2006/main" xmlns:r="http://schemas.openxmlformats.org/officeDocument/2006/relationships" xmlns:p="http://schemas.openxmlformats.org/presentationml/2006/main">
   <p:cSld>
     <p:spTree>

</xml_diff>